<commit_message>
added ability to create project approvals.
</commit_message>
<xml_diff>
--- a/samplePPTX.pptx
+++ b/samplePPTX.pptx
@@ -318,7 +318,7 @@
             <a:fld id="{0DAB70E3-47D6-2842-9376-028C836601F0}" type="datetimeFigureOut">
               <a:rPr lang="en-US" smtClean="0"/>
               <a:pPr/>
-              <a:t>8/25/19</a:t>
+              <a:t>8/26/19</a:t>
             </a:fld>
             <a:endParaRPr lang="en-US" dirty="0"/>
           </a:p>
@@ -475,7 +475,7 @@
           <a:p>
             <a:fld id="{0DAB70E3-47D6-2842-9376-028C836601F0}" type="datetimeFigureOut">
               <a:rPr lang="en-US" smtClean="0"/>
-              <a:t>8/25/19</a:t>
+              <a:t>8/26/19</a:t>
             </a:fld>
             <a:endParaRPr lang="en-US"/>
           </a:p>
@@ -537,7 +537,7 @@
 </file>
 
 <file path=ppt/slideLayouts/slideLayout3.xml><?xml version="1.0" encoding="utf-8"?>
-<p:sldLayout xmlns:a="http://schemas.openxmlformats.org/drawingml/2006/main" xmlns:r="http://schemas.openxmlformats.org/officeDocument/2006/relationships" xmlns:p="http://schemas.openxmlformats.org/presentationml/2006/main" showMasterSp="0" preserve="1" userDrawn="1">
+<p:sldLayout xmlns:a="http://schemas.openxmlformats.org/drawingml/2006/main" xmlns:r="http://schemas.openxmlformats.org/officeDocument/2006/relationships" xmlns:p="http://schemas.openxmlformats.org/presentationml/2006/main" preserve="1" userDrawn="1">
   <p:cSld name="1_Title and Content">
     <p:spTree>
       <p:nvGrpSpPr>
@@ -565,16 +565,24 @@
         </p:nvSpPr>
         <p:spPr>
           <a:xfrm>
-            <a:off x="233923" y="1468642"/>
-            <a:ext cx="3112129" cy="2686171"/>
-          </a:xfrm>
+            <a:off x="219547" y="4946262"/>
+            <a:ext cx="6391748" cy="3588118"/>
+          </a:xfrm>
+          <a:ln>
+            <a:solidFill>
+              <a:schemeClr val="bg2">
+                <a:lumMod val="90000"/>
+              </a:schemeClr>
+            </a:solidFill>
+          </a:ln>
         </p:spPr>
         <p:txBody>
           <a:bodyPr>
             <a:normAutofit/>
           </a:bodyPr>
           <a:lstStyle>
-            <a:lvl1pPr>
+            <a:lvl1pPr marL="0" indent="0">
+              <a:buNone/>
               <a:defRPr sz="1050"/>
             </a:lvl1pPr>
             <a:lvl2pPr>
@@ -645,7 +653,7 @@
           <a:p>
             <a:fld id="{0DAB70E3-47D6-2842-9376-028C836601F0}" type="datetimeFigureOut">
               <a:rPr lang="en-US" smtClean="0"/>
-              <a:t>8/25/19</a:t>
+              <a:t>8/26/19</a:t>
             </a:fld>
             <a:endParaRPr lang="en-US"/>
           </a:p>
@@ -707,8 +715,8 @@
         </p:nvSpPr>
         <p:spPr>
           <a:xfrm>
-            <a:off x="233922" y="1191643"/>
-            <a:ext cx="3112129" cy="276999"/>
+            <a:off x="219547" y="1307335"/>
+            <a:ext cx="3112129" cy="369332"/>
           </a:xfrm>
           <a:prstGeom prst="rect">
             <a:avLst/>
@@ -722,92 +730,8 @@
           <a:lstStyle/>
           <a:p>
             <a:r>
-              <a:rPr lang="en-US" dirty="0"/>
+              <a:rPr lang="en-US" sz="2400" dirty="0"/>
               <a:t>Project Proposal</a:t>
-            </a:r>
-          </a:p>
-        </p:txBody>
-      </p:sp>
-      <p:sp>
-        <p:nvSpPr>
-          <p:cNvPr id="10" name="TextBox 9">
-            <a:extLst>
-              <a:ext uri="{FF2B5EF4-FFF2-40B4-BE49-F238E27FC236}">
-                <a16:creationId xmlns:a16="http://schemas.microsoft.com/office/drawing/2014/main" id="{DE482BE1-5E53-B048-9DF5-7E539A2FDCF7}"/>
-              </a:ext>
-            </a:extLst>
-          </p:cNvPr>
-          <p:cNvSpPr txBox="1"/>
-          <p:nvPr userDrawn="1"/>
-        </p:nvSpPr>
-        <p:spPr>
-          <a:xfrm>
-            <a:off x="2437016" y="-5068"/>
-            <a:ext cx="1828800" cy="169277"/>
-          </a:xfrm>
-          <a:prstGeom prst="rect">
-            <a:avLst/>
-          </a:prstGeom>
-          <a:noFill/>
-        </p:spPr>
-        <p:txBody>
-          <a:bodyPr wrap="square" lIns="0" tIns="0" rIns="0" bIns="0" rtlCol="0">
-            <a:noAutofit/>
-          </a:bodyPr>
-          <a:lstStyle/>
-          <a:p>
-            <a:r>
-              <a:rPr lang="en-US" sz="1100" dirty="0"/>
-              <a:t>Status</a:t>
-            </a:r>
-          </a:p>
-        </p:txBody>
-      </p:sp>
-      <p:sp>
-        <p:nvSpPr>
-          <p:cNvPr id="14" name="Text Placeholder 12">
-            <a:extLst>
-              <a:ext uri="{FF2B5EF4-FFF2-40B4-BE49-F238E27FC236}">
-                <a16:creationId xmlns:a16="http://schemas.microsoft.com/office/drawing/2014/main" id="{F242FF22-7F78-2045-8DE7-F3DF96320CC4}"/>
-              </a:ext>
-            </a:extLst>
-          </p:cNvPr>
-          <p:cNvSpPr>
-            <a:spLocks noGrp="1"/>
-          </p:cNvSpPr>
-          <p:nvPr>
-            <p:ph type="body" sz="quarter" idx="14"/>
-          </p:nvPr>
-        </p:nvSpPr>
-        <p:spPr>
-          <a:xfrm>
-            <a:off x="2421295" y="137160"/>
-            <a:ext cx="2011680" cy="274320"/>
-          </a:xfrm>
-          <a:ln>
-            <a:solidFill>
-              <a:schemeClr val="accent1">
-                <a:lumMod val="60000"/>
-                <a:lumOff val="40000"/>
-              </a:schemeClr>
-            </a:solidFill>
-          </a:ln>
-        </p:spPr>
-        <p:txBody>
-          <a:bodyPr lIns="91440" tIns="0" rIns="91440" bIns="0" anchor="ctr">
-            <a:noAutofit/>
-          </a:bodyPr>
-          <a:lstStyle>
-            <a:lvl1pPr marL="0" indent="0" algn="ctr">
-              <a:buNone/>
-              <a:defRPr sz="1800"/>
-            </a:lvl1pPr>
-          </a:lstStyle>
-          <a:p>
-            <a:pPr lvl="0"/>
-            <a:r>
-              <a:rPr lang="en-US"/>
-              <a:t>Click to edit Master text styles</a:t>
             </a:r>
           </a:p>
         </p:txBody>
@@ -830,14 +754,13 @@
         </p:nvSpPr>
         <p:spPr>
           <a:xfrm>
-            <a:off x="3501413" y="1474877"/>
-            <a:ext cx="1001626" cy="580465"/>
+            <a:off x="236796" y="1787943"/>
+            <a:ext cx="1828800" cy="548640"/>
           </a:xfrm>
           <a:ln>
             <a:solidFill>
-              <a:schemeClr val="accent1">
-                <a:lumMod val="60000"/>
-                <a:lumOff val="40000"/>
+              <a:schemeClr val="bg2">
+                <a:lumMod val="90000"/>
               </a:schemeClr>
             </a:solidFill>
           </a:ln>
@@ -849,7 +772,7 @@
           <a:lstStyle>
             <a:lvl1pPr marL="0" indent="0" algn="ctr">
               <a:buNone/>
-              <a:defRPr sz="1200"/>
+              <a:defRPr sz="1800"/>
             </a:lvl1pPr>
           </a:lstStyle>
           <a:p>
@@ -875,8 +798,8 @@
         </p:nvSpPr>
         <p:spPr>
           <a:xfrm>
-            <a:off x="3453838" y="2051363"/>
-            <a:ext cx="1096775" cy="215444"/>
+            <a:off x="236796" y="2349836"/>
+            <a:ext cx="1828800" cy="182880"/>
           </a:xfrm>
           <a:prstGeom prst="rect">
             <a:avLst/>
@@ -884,11 +807,12 @@
           <a:noFill/>
         </p:spPr>
         <p:txBody>
-          <a:bodyPr wrap="none" rtlCol="0">
-            <a:spAutoFit/>
+          <a:bodyPr wrap="square" rtlCol="0">
+            <a:noAutofit/>
           </a:bodyPr>
           <a:lstStyle/>
           <a:p>
+            <a:pPr algn="ctr"/>
             <a:r>
               <a:rPr lang="en-US" sz="800" dirty="0"/>
               <a:t>Return on Investment</a:t>
@@ -914,14 +838,13 @@
         </p:nvSpPr>
         <p:spPr>
           <a:xfrm>
-            <a:off x="4559494" y="1474877"/>
-            <a:ext cx="1001626" cy="584667"/>
+            <a:off x="2514703" y="1792009"/>
+            <a:ext cx="1828800" cy="548640"/>
           </a:xfrm>
           <a:ln>
             <a:solidFill>
-              <a:schemeClr val="accent1">
-                <a:lumMod val="60000"/>
-                <a:lumOff val="40000"/>
+              <a:schemeClr val="bg2">
+                <a:lumMod val="90000"/>
               </a:schemeClr>
             </a:solidFill>
           </a:ln>
@@ -933,7 +856,7 @@
           <a:lstStyle>
             <a:lvl1pPr marL="0" indent="0" algn="ctr">
               <a:buNone/>
-              <a:defRPr sz="1200"/>
+              <a:defRPr sz="1800"/>
             </a:lvl1pPr>
           </a:lstStyle>
           <a:p>
@@ -963,14 +886,13 @@
         </p:nvSpPr>
         <p:spPr>
           <a:xfrm>
-            <a:off x="5617575" y="1474877"/>
-            <a:ext cx="1001626" cy="584665"/>
+            <a:off x="4772392" y="1798249"/>
+            <a:ext cx="1828800" cy="548640"/>
           </a:xfrm>
           <a:ln>
             <a:solidFill>
-              <a:schemeClr val="accent1">
-                <a:lumMod val="60000"/>
-                <a:lumOff val="40000"/>
+              <a:schemeClr val="bg2">
+                <a:lumMod val="90000"/>
               </a:schemeClr>
             </a:solidFill>
           </a:ln>
@@ -982,7 +904,7 @@
           <a:lstStyle>
             <a:lvl1pPr marL="0" indent="0" algn="ctr">
               <a:buNone/>
-              <a:defRPr sz="1200"/>
+              <a:defRPr sz="1800"/>
             </a:lvl1pPr>
           </a:lstStyle>
           <a:p>
@@ -1008,8 +930,8 @@
         </p:nvSpPr>
         <p:spPr>
           <a:xfrm>
-            <a:off x="4680512" y="2059547"/>
-            <a:ext cx="752129" cy="215444"/>
+            <a:off x="2514703" y="2364512"/>
+            <a:ext cx="1828800" cy="182880"/>
           </a:xfrm>
           <a:prstGeom prst="rect">
             <a:avLst/>
@@ -1018,10 +940,11 @@
         </p:spPr>
         <p:txBody>
           <a:bodyPr wrap="none" rtlCol="0">
-            <a:spAutoFit/>
+            <a:noAutofit/>
           </a:bodyPr>
           <a:lstStyle/>
           <a:p>
+            <a:pPr algn="ctr"/>
             <a:r>
               <a:rPr lang="en-US" sz="800" dirty="0"/>
               <a:t>3 Year Return</a:t>
@@ -1043,8 +966,8 @@
         </p:nvSpPr>
         <p:spPr>
           <a:xfrm>
-            <a:off x="5673394" y="2051363"/>
-            <a:ext cx="889987" cy="215444"/>
+            <a:off x="4772392" y="2363088"/>
+            <a:ext cx="1828800" cy="182880"/>
           </a:xfrm>
           <a:prstGeom prst="rect">
             <a:avLst/>
@@ -1053,10 +976,11 @@
         </p:spPr>
         <p:txBody>
           <a:bodyPr wrap="none" rtlCol="0">
-            <a:spAutoFit/>
+            <a:noAutofit/>
           </a:bodyPr>
           <a:lstStyle/>
           <a:p>
+            <a:pPr algn="ctr"/>
             <a:r>
               <a:rPr lang="en-US" sz="800" dirty="0"/>
               <a:t>All In Investment</a:t>
@@ -1078,7 +1002,7 @@
         </p:nvSpPr>
         <p:spPr>
           <a:xfrm>
-            <a:off x="3501600" y="2403874"/>
+            <a:off x="3479404" y="2933164"/>
             <a:ext cx="1098378" cy="215444"/>
           </a:xfrm>
           <a:prstGeom prst="rect">
@@ -1113,7 +1037,7 @@
         </p:nvSpPr>
         <p:spPr>
           <a:xfrm>
-            <a:off x="3498837" y="2721914"/>
+            <a:off x="3476641" y="3304212"/>
             <a:ext cx="1197764" cy="215444"/>
           </a:xfrm>
           <a:prstGeom prst="rect">
@@ -1148,7 +1072,7 @@
         </p:nvSpPr>
         <p:spPr>
           <a:xfrm>
-            <a:off x="3492065" y="3039954"/>
+            <a:off x="3469869" y="3675260"/>
             <a:ext cx="1262012" cy="215444"/>
           </a:xfrm>
           <a:prstGeom prst="rect">
@@ -1187,14 +1111,13 @@
         </p:nvSpPr>
         <p:spPr>
           <a:xfrm>
-            <a:off x="4794589" y="2372690"/>
+            <a:off x="4772393" y="2901980"/>
             <a:ext cx="1815263" cy="277812"/>
           </a:xfrm>
           <a:ln>
             <a:solidFill>
-              <a:schemeClr val="accent1">
-                <a:lumMod val="60000"/>
-                <a:lumOff val="40000"/>
+              <a:schemeClr val="bg2">
+                <a:lumMod val="90000"/>
               </a:schemeClr>
             </a:solidFill>
           </a:ln>
@@ -1236,14 +1159,13 @@
         </p:nvSpPr>
         <p:spPr>
           <a:xfrm>
-            <a:off x="4794589" y="2690730"/>
+            <a:off x="4772393" y="3273028"/>
             <a:ext cx="1815263" cy="277812"/>
           </a:xfrm>
           <a:ln>
             <a:solidFill>
-              <a:schemeClr val="accent1">
-                <a:lumMod val="60000"/>
-                <a:lumOff val="40000"/>
+              <a:schemeClr val="bg2">
+                <a:lumMod val="90000"/>
               </a:schemeClr>
             </a:solidFill>
           </a:ln>
@@ -1285,14 +1207,13 @@
         </p:nvSpPr>
         <p:spPr>
           <a:xfrm>
-            <a:off x="4794588" y="3004951"/>
+            <a:off x="4772392" y="3640257"/>
             <a:ext cx="1815263" cy="277812"/>
           </a:xfrm>
           <a:ln>
             <a:solidFill>
-              <a:schemeClr val="accent1">
-                <a:lumMod val="60000"/>
-                <a:lumOff val="40000"/>
+              <a:schemeClr val="bg2">
+                <a:lumMod val="90000"/>
               </a:schemeClr>
             </a:solidFill>
           </a:ln>
@@ -1330,7 +1251,7 @@
         </p:nvSpPr>
         <p:spPr>
           <a:xfrm>
-            <a:off x="3503002" y="3584732"/>
+            <a:off x="3493949" y="4299536"/>
             <a:ext cx="1189428" cy="184666"/>
           </a:xfrm>
           <a:prstGeom prst="rect">
@@ -1369,14 +1290,13 @@
         </p:nvSpPr>
         <p:spPr>
           <a:xfrm>
-            <a:off x="4810847" y="3538159"/>
+            <a:off x="4801794" y="4266215"/>
             <a:ext cx="1815263" cy="277812"/>
           </a:xfrm>
           <a:ln>
             <a:solidFill>
-              <a:schemeClr val="accent1">
-                <a:lumMod val="60000"/>
-                <a:lumOff val="40000"/>
+              <a:schemeClr val="bg2">
+                <a:lumMod val="90000"/>
               </a:schemeClr>
             </a:solidFill>
           </a:ln>
@@ -1414,7 +1334,7 @@
         </p:nvSpPr>
         <p:spPr>
           <a:xfrm>
-            <a:off x="3492065" y="3897879"/>
+            <a:off x="237940" y="4320035"/>
             <a:ext cx="421462" cy="184666"/>
           </a:xfrm>
           <a:prstGeom prst="rect">
@@ -1453,14 +1373,13 @@
         </p:nvSpPr>
         <p:spPr>
           <a:xfrm>
-            <a:off x="4810407" y="3851306"/>
+            <a:off x="1543030" y="4273462"/>
             <a:ext cx="1815263" cy="277812"/>
           </a:xfrm>
           <a:ln>
             <a:solidFill>
-              <a:schemeClr val="accent1">
-                <a:lumMod val="60000"/>
-                <a:lumOff val="40000"/>
+              <a:schemeClr val="bg2">
+                <a:lumMod val="90000"/>
               </a:schemeClr>
             </a:solidFill>
           </a:ln>
@@ -1484,55 +1403,6 @@
           </a:p>
         </p:txBody>
       </p:sp>
-      <p:sp>
-        <p:nvSpPr>
-          <p:cNvPr id="52" name="Text Placeholder 12">
-            <a:extLst>
-              <a:ext uri="{FF2B5EF4-FFF2-40B4-BE49-F238E27FC236}">
-                <a16:creationId xmlns:a16="http://schemas.microsoft.com/office/drawing/2014/main" id="{0DD03C24-83B2-E04F-8738-E9DD17116BF1}"/>
-              </a:ext>
-            </a:extLst>
-          </p:cNvPr>
-          <p:cNvSpPr>
-            <a:spLocks noGrp="1"/>
-          </p:cNvSpPr>
-          <p:nvPr>
-            <p:ph type="body" sz="quarter" idx="23"/>
-          </p:nvPr>
-        </p:nvSpPr>
-        <p:spPr>
-          <a:xfrm>
-            <a:off x="4613990" y="137160"/>
-            <a:ext cx="2011680" cy="274320"/>
-          </a:xfrm>
-          <a:ln>
-            <a:solidFill>
-              <a:schemeClr val="accent1">
-                <a:lumMod val="60000"/>
-                <a:lumOff val="40000"/>
-              </a:schemeClr>
-            </a:solidFill>
-          </a:ln>
-        </p:spPr>
-        <p:txBody>
-          <a:bodyPr lIns="91440" tIns="0" rIns="91440" bIns="0" anchor="ctr">
-            <a:noAutofit/>
-          </a:bodyPr>
-          <a:lstStyle>
-            <a:lvl1pPr marL="0" indent="0" algn="ctr">
-              <a:buNone/>
-              <a:defRPr sz="1800"/>
-            </a:lvl1pPr>
-          </a:lstStyle>
-          <a:p>
-            <a:pPr lvl="0"/>
-            <a:r>
-              <a:rPr lang="en-US"/>
-              <a:t>Click to edit Master text styles</a:t>
-            </a:r>
-          </a:p>
-        </p:txBody>
-      </p:sp>
       <p:cxnSp>
         <p:nvCxnSpPr>
           <p:cNvPr id="55" name="Straight Connector 54">
@@ -1542,17 +1412,26 @@
               </a:ext>
             </a:extLst>
           </p:cNvPr>
-          <p:cNvCxnSpPr/>
+          <p:cNvCxnSpPr>
+            <a:cxnSpLocks/>
+          </p:cNvCxnSpPr>
           <p:nvPr userDrawn="1"/>
         </p:nvCxnSpPr>
         <p:spPr>
           <a:xfrm>
-            <a:off x="3469841" y="2266814"/>
-            <a:ext cx="3200400" cy="0"/>
+            <a:off x="220583" y="2716592"/>
+            <a:ext cx="6367072" cy="0"/>
           </a:xfrm>
           <a:prstGeom prst="line">
             <a:avLst/>
           </a:prstGeom>
+          <a:ln>
+            <a:solidFill>
+              <a:schemeClr val="bg2">
+                <a:lumMod val="90000"/>
+              </a:schemeClr>
+            </a:solidFill>
+          </a:ln>
         </p:spPr>
         <p:style>
           <a:lnRef idx="1">
@@ -1578,17 +1457,26 @@
               </a:ext>
             </a:extLst>
           </p:cNvPr>
-          <p:cNvCxnSpPr/>
+          <p:cNvCxnSpPr>
+            <a:cxnSpLocks/>
+          </p:cNvCxnSpPr>
           <p:nvPr userDrawn="1"/>
         </p:nvCxnSpPr>
         <p:spPr>
           <a:xfrm>
-            <a:off x="3480043" y="3417329"/>
-            <a:ext cx="3200400" cy="0"/>
+            <a:off x="219547" y="4092377"/>
+            <a:ext cx="6397070" cy="0"/>
           </a:xfrm>
           <a:prstGeom prst="line">
             <a:avLst/>
           </a:prstGeom>
+          <a:ln>
+            <a:solidFill>
+              <a:schemeClr val="bg2">
+                <a:lumMod val="90000"/>
+              </a:schemeClr>
+            </a:solidFill>
+          </a:ln>
         </p:spPr>
         <p:style>
           <a:lnRef idx="1">
@@ -1623,7 +1511,7 @@
         </p:nvSpPr>
         <p:spPr>
           <a:xfrm>
-            <a:off x="919723" y="576831"/>
+            <a:off x="882177" y="244538"/>
             <a:ext cx="5715000" cy="457200"/>
           </a:xfrm>
         </p:spPr>
@@ -1635,155 +1523,7 @@
               <a:rPr lang="en-US"/>
               <a:t>Click to edit Master title style</a:t>
             </a:r>
-          </a:p>
-        </p:txBody>
-      </p:sp>
-      <p:pic>
-        <p:nvPicPr>
-          <p:cNvPr id="87" name="Picture 86" descr="A picture containing vector graphics&#10;&#10;Description automatically generated">
-            <a:extLst>
-              <a:ext uri="{FF2B5EF4-FFF2-40B4-BE49-F238E27FC236}">
-                <a16:creationId xmlns:a16="http://schemas.microsoft.com/office/drawing/2014/main" id="{193CBE12-180E-BC43-83E6-3C438BC0DAD3}"/>
-              </a:ext>
-            </a:extLst>
-          </p:cNvPr>
-          <p:cNvPicPr>
-            <a:picLocks noChangeAspect="1"/>
-          </p:cNvPicPr>
-          <p:nvPr userDrawn="1"/>
-        </p:nvPicPr>
-        <p:blipFill>
-          <a:blip r:embed="rId2"/>
-          <a:stretch>
-            <a:fillRect/>
-          </a:stretch>
-        </p:blipFill>
-        <p:spPr>
-          <a:xfrm>
-            <a:off x="233922" y="576831"/>
-            <a:ext cx="457200" cy="457200"/>
-          </a:xfrm>
-          <a:prstGeom prst="rect">
-            <a:avLst/>
-          </a:prstGeom>
-        </p:spPr>
-      </p:pic>
-      <p:sp>
-        <p:nvSpPr>
-          <p:cNvPr id="88" name="TextBox 87">
-            <a:extLst>
-              <a:ext uri="{FF2B5EF4-FFF2-40B4-BE49-F238E27FC236}">
-                <a16:creationId xmlns:a16="http://schemas.microsoft.com/office/drawing/2014/main" id="{7CF9F0B9-21D7-C34D-A37E-1AC9869E2DAD}"/>
-              </a:ext>
-            </a:extLst>
-          </p:cNvPr>
-          <p:cNvSpPr txBox="1"/>
-          <p:nvPr userDrawn="1"/>
-        </p:nvSpPr>
-        <p:spPr>
-          <a:xfrm>
-            <a:off x="4631057" y="1982"/>
-            <a:ext cx="1828800" cy="169277"/>
-          </a:xfrm>
-          <a:prstGeom prst="rect">
-            <a:avLst/>
-          </a:prstGeom>
-          <a:noFill/>
-        </p:spPr>
-        <p:txBody>
-          <a:bodyPr wrap="square" lIns="0" tIns="0" rIns="0" bIns="0" rtlCol="0">
-            <a:noAutofit/>
-          </a:bodyPr>
-          <a:lstStyle/>
-          <a:p>
-            <a:r>
-              <a:rPr lang="en-US" sz="1100" dirty="0"/>
-              <a:t>Return Type</a:t>
-            </a:r>
-          </a:p>
-        </p:txBody>
-      </p:sp>
-      <p:sp>
-        <p:nvSpPr>
-          <p:cNvPr id="89" name="TextBox 88">
-            <a:extLst>
-              <a:ext uri="{FF2B5EF4-FFF2-40B4-BE49-F238E27FC236}">
-                <a16:creationId xmlns:a16="http://schemas.microsoft.com/office/drawing/2014/main" id="{C5EB53A7-8756-9B4F-A8C3-F9CBD8E326D6}"/>
-              </a:ext>
-            </a:extLst>
-          </p:cNvPr>
-          <p:cNvSpPr txBox="1"/>
-          <p:nvPr userDrawn="1"/>
-        </p:nvSpPr>
-        <p:spPr>
-          <a:xfrm>
-            <a:off x="233922" y="-20017"/>
-            <a:ext cx="1828800" cy="169277"/>
-          </a:xfrm>
-          <a:prstGeom prst="rect">
-            <a:avLst/>
-          </a:prstGeom>
-          <a:noFill/>
-        </p:spPr>
-        <p:txBody>
-          <a:bodyPr wrap="square" lIns="0" tIns="0" rIns="0" bIns="0" rtlCol="0">
-            <a:noAutofit/>
-          </a:bodyPr>
-          <a:lstStyle/>
-          <a:p>
-            <a:r>
-              <a:rPr lang="en-US" sz="1100" dirty="0"/>
-              <a:t>Sponsoring Department</a:t>
-            </a:r>
-          </a:p>
-        </p:txBody>
-      </p:sp>
-      <p:sp>
-        <p:nvSpPr>
-          <p:cNvPr id="90" name="Text Placeholder 12">
-            <a:extLst>
-              <a:ext uri="{FF2B5EF4-FFF2-40B4-BE49-F238E27FC236}">
-                <a16:creationId xmlns:a16="http://schemas.microsoft.com/office/drawing/2014/main" id="{46FB2E09-EB9E-D040-8C24-FC516454F0E7}"/>
-              </a:ext>
-            </a:extLst>
-          </p:cNvPr>
-          <p:cNvSpPr>
-            <a:spLocks noGrp="1"/>
-          </p:cNvSpPr>
-          <p:nvPr>
-            <p:ph type="body" sz="quarter" idx="24"/>
-          </p:nvPr>
-        </p:nvSpPr>
-        <p:spPr>
-          <a:xfrm>
-            <a:off x="228600" y="137160"/>
-            <a:ext cx="2011680" cy="274320"/>
-          </a:xfrm>
-          <a:ln>
-            <a:solidFill>
-              <a:schemeClr val="accent1">
-                <a:lumMod val="60000"/>
-                <a:lumOff val="40000"/>
-              </a:schemeClr>
-            </a:solidFill>
-          </a:ln>
-        </p:spPr>
-        <p:txBody>
-          <a:bodyPr lIns="91440" tIns="0" rIns="91440" bIns="0" anchor="ctr">
-            <a:noAutofit/>
-          </a:bodyPr>
-          <a:lstStyle>
-            <a:lvl1pPr marL="0" indent="0" algn="ctr">
-              <a:buNone/>
-              <a:defRPr sz="1800"/>
-            </a:lvl1pPr>
-          </a:lstStyle>
-          <a:p>
-            <a:pPr lvl="0"/>
-            <a:r>
-              <a:rPr lang="en-US"/>
-              <a:t>Click to edit Master text styles</a:t>
-            </a:r>
+            <a:endParaRPr lang="en-US" dirty="0"/>
           </a:p>
         </p:txBody>
       </p:sp>
@@ -1803,12 +1543,19 @@
         </p:nvCxnSpPr>
         <p:spPr>
           <a:xfrm>
-            <a:off x="228600" y="4266851"/>
+            <a:off x="219547" y="4729862"/>
             <a:ext cx="6406123" cy="0"/>
           </a:xfrm>
           <a:prstGeom prst="line">
             <a:avLst/>
           </a:prstGeom>
+          <a:ln>
+            <a:solidFill>
+              <a:schemeClr val="bg2">
+                <a:lumMod val="90000"/>
+              </a:schemeClr>
+            </a:solidFill>
+          </a:ln>
         </p:spPr>
         <p:style>
           <a:lnRef idx="1">
@@ -1825,6 +1572,299 @@
           </a:fontRef>
         </p:style>
       </p:cxnSp>
+      <p:sp>
+        <p:nvSpPr>
+          <p:cNvPr id="35" name="TextBox 34">
+            <a:extLst>
+              <a:ext uri="{FF2B5EF4-FFF2-40B4-BE49-F238E27FC236}">
+                <a16:creationId xmlns:a16="http://schemas.microsoft.com/office/drawing/2014/main" id="{9881321F-F001-B940-AC50-3065D182E00C}"/>
+              </a:ext>
+            </a:extLst>
+          </p:cNvPr>
+          <p:cNvSpPr txBox="1"/>
+          <p:nvPr userDrawn="1"/>
+        </p:nvSpPr>
+        <p:spPr>
+          <a:xfrm>
+            <a:off x="240703" y="2933164"/>
+            <a:ext cx="939296" cy="215444"/>
+          </a:xfrm>
+          <a:prstGeom prst="rect">
+            <a:avLst/>
+          </a:prstGeom>
+          <a:noFill/>
+        </p:spPr>
+        <p:txBody>
+          <a:bodyPr wrap="none" lIns="0" tIns="0" rIns="0" bIns="0" rtlCol="0">
+            <a:spAutoFit/>
+          </a:bodyPr>
+          <a:lstStyle/>
+          <a:p>
+            <a:r>
+              <a:rPr lang="en-US" sz="1400" dirty="0"/>
+              <a:t>Department:</a:t>
+            </a:r>
+          </a:p>
+        </p:txBody>
+      </p:sp>
+      <p:sp>
+        <p:nvSpPr>
+          <p:cNvPr id="36" name="TextBox 35">
+            <a:extLst>
+              <a:ext uri="{FF2B5EF4-FFF2-40B4-BE49-F238E27FC236}">
+                <a16:creationId xmlns:a16="http://schemas.microsoft.com/office/drawing/2014/main" id="{C2F021C4-C7F0-4D43-888E-E2D9C5DBB382}"/>
+              </a:ext>
+            </a:extLst>
+          </p:cNvPr>
+          <p:cNvSpPr txBox="1"/>
+          <p:nvPr userDrawn="1"/>
+        </p:nvSpPr>
+        <p:spPr>
+          <a:xfrm>
+            <a:off x="237940" y="3304212"/>
+            <a:ext cx="499496" cy="215444"/>
+          </a:xfrm>
+          <a:prstGeom prst="rect">
+            <a:avLst/>
+          </a:prstGeom>
+          <a:noFill/>
+        </p:spPr>
+        <p:txBody>
+          <a:bodyPr wrap="none" lIns="0" tIns="0" rIns="0" bIns="0" rtlCol="0">
+            <a:spAutoFit/>
+          </a:bodyPr>
+          <a:lstStyle/>
+          <a:p>
+            <a:r>
+              <a:rPr lang="en-US" sz="1400" dirty="0"/>
+              <a:t>Status:</a:t>
+            </a:r>
+          </a:p>
+        </p:txBody>
+      </p:sp>
+      <p:sp>
+        <p:nvSpPr>
+          <p:cNvPr id="37" name="TextBox 36">
+            <a:extLst>
+              <a:ext uri="{FF2B5EF4-FFF2-40B4-BE49-F238E27FC236}">
+                <a16:creationId xmlns:a16="http://schemas.microsoft.com/office/drawing/2014/main" id="{B3FD3ED4-E2FF-964D-B985-4039ECFF91FF}"/>
+              </a:ext>
+            </a:extLst>
+          </p:cNvPr>
+          <p:cNvSpPr txBox="1"/>
+          <p:nvPr userDrawn="1"/>
+        </p:nvSpPr>
+        <p:spPr>
+          <a:xfrm>
+            <a:off x="231168" y="3675260"/>
+            <a:ext cx="930319" cy="215444"/>
+          </a:xfrm>
+          <a:prstGeom prst="rect">
+            <a:avLst/>
+          </a:prstGeom>
+          <a:noFill/>
+        </p:spPr>
+        <p:txBody>
+          <a:bodyPr wrap="none" lIns="0" tIns="0" rIns="0" bIns="0" rtlCol="0">
+            <a:spAutoFit/>
+          </a:bodyPr>
+          <a:lstStyle/>
+          <a:p>
+            <a:r>
+              <a:rPr lang="en-US" sz="1400" dirty="0"/>
+              <a:t>Return Type:</a:t>
+            </a:r>
+          </a:p>
+        </p:txBody>
+      </p:sp>
+      <p:sp>
+        <p:nvSpPr>
+          <p:cNvPr id="38" name="Text Placeholder 12">
+            <a:extLst>
+              <a:ext uri="{FF2B5EF4-FFF2-40B4-BE49-F238E27FC236}">
+                <a16:creationId xmlns:a16="http://schemas.microsoft.com/office/drawing/2014/main" id="{93E0CF29-E6C0-BA48-9CE6-ECE593CB1FD9}"/>
+              </a:ext>
+            </a:extLst>
+          </p:cNvPr>
+          <p:cNvSpPr>
+            <a:spLocks noGrp="1"/>
+          </p:cNvSpPr>
+          <p:nvPr>
+            <p:ph type="body" sz="quarter" idx="23"/>
+          </p:nvPr>
+        </p:nvSpPr>
+        <p:spPr>
+          <a:xfrm>
+            <a:off x="1533692" y="2901980"/>
+            <a:ext cx="1815263" cy="277812"/>
+          </a:xfrm>
+          <a:ln>
+            <a:solidFill>
+              <a:schemeClr val="bg2">
+                <a:lumMod val="90000"/>
+              </a:schemeClr>
+            </a:solidFill>
+          </a:ln>
+        </p:spPr>
+        <p:txBody>
+          <a:bodyPr anchor="ctr">
+            <a:noAutofit/>
+          </a:bodyPr>
+          <a:lstStyle>
+            <a:lvl1pPr marL="0" indent="0" algn="l">
+              <a:buNone/>
+              <a:defRPr sz="1200"/>
+            </a:lvl1pPr>
+          </a:lstStyle>
+          <a:p>
+            <a:pPr lvl="0"/>
+            <a:r>
+              <a:rPr lang="en-US"/>
+              <a:t>Click to edit Master text styles</a:t>
+            </a:r>
+          </a:p>
+        </p:txBody>
+      </p:sp>
+      <p:sp>
+        <p:nvSpPr>
+          <p:cNvPr id="39" name="Text Placeholder 12">
+            <a:extLst>
+              <a:ext uri="{FF2B5EF4-FFF2-40B4-BE49-F238E27FC236}">
+                <a16:creationId xmlns:a16="http://schemas.microsoft.com/office/drawing/2014/main" id="{04581559-2A88-F241-9E13-536ED35AAE6F}"/>
+              </a:ext>
+            </a:extLst>
+          </p:cNvPr>
+          <p:cNvSpPr>
+            <a:spLocks noGrp="1"/>
+          </p:cNvSpPr>
+          <p:nvPr>
+            <p:ph type="body" sz="quarter" idx="24"/>
+          </p:nvPr>
+        </p:nvSpPr>
+        <p:spPr>
+          <a:xfrm>
+            <a:off x="1533692" y="3273028"/>
+            <a:ext cx="1815263" cy="277812"/>
+          </a:xfrm>
+          <a:ln>
+            <a:solidFill>
+              <a:schemeClr val="bg2">
+                <a:lumMod val="90000"/>
+              </a:schemeClr>
+            </a:solidFill>
+          </a:ln>
+        </p:spPr>
+        <p:txBody>
+          <a:bodyPr anchor="ctr">
+            <a:noAutofit/>
+          </a:bodyPr>
+          <a:lstStyle>
+            <a:lvl1pPr marL="0" indent="0" algn="l">
+              <a:buNone/>
+              <a:defRPr sz="1200"/>
+            </a:lvl1pPr>
+          </a:lstStyle>
+          <a:p>
+            <a:pPr lvl="0"/>
+            <a:r>
+              <a:rPr lang="en-US"/>
+              <a:t>Click to edit Master text styles</a:t>
+            </a:r>
+          </a:p>
+        </p:txBody>
+      </p:sp>
+      <p:sp>
+        <p:nvSpPr>
+          <p:cNvPr id="40" name="Text Placeholder 12">
+            <a:extLst>
+              <a:ext uri="{FF2B5EF4-FFF2-40B4-BE49-F238E27FC236}">
+                <a16:creationId xmlns:a16="http://schemas.microsoft.com/office/drawing/2014/main" id="{3FA6C54C-385F-D749-B982-436AD78D89BE}"/>
+              </a:ext>
+            </a:extLst>
+          </p:cNvPr>
+          <p:cNvSpPr>
+            <a:spLocks noGrp="1"/>
+          </p:cNvSpPr>
+          <p:nvPr>
+            <p:ph type="body" sz="quarter" idx="25"/>
+          </p:nvPr>
+        </p:nvSpPr>
+        <p:spPr>
+          <a:xfrm>
+            <a:off x="1533691" y="3640257"/>
+            <a:ext cx="1815263" cy="277812"/>
+          </a:xfrm>
+          <a:ln>
+            <a:solidFill>
+              <a:schemeClr val="bg2">
+                <a:lumMod val="90000"/>
+              </a:schemeClr>
+            </a:solidFill>
+          </a:ln>
+        </p:spPr>
+        <p:txBody>
+          <a:bodyPr anchor="ctr">
+            <a:noAutofit/>
+          </a:bodyPr>
+          <a:lstStyle>
+            <a:lvl1pPr marL="0" indent="0" algn="l">
+              <a:buNone/>
+              <a:defRPr sz="1200"/>
+            </a:lvl1pPr>
+          </a:lstStyle>
+          <a:p>
+            <a:pPr lvl="0"/>
+            <a:r>
+              <a:rPr lang="en-US"/>
+              <a:t>Click to edit Master text styles</a:t>
+            </a:r>
+          </a:p>
+        </p:txBody>
+      </p:sp>
+      <p:sp>
+        <p:nvSpPr>
+          <p:cNvPr id="45" name="Text Placeholder 12">
+            <a:extLst>
+              <a:ext uri="{FF2B5EF4-FFF2-40B4-BE49-F238E27FC236}">
+                <a16:creationId xmlns:a16="http://schemas.microsoft.com/office/drawing/2014/main" id="{A101ECDD-D62D-B942-AC19-FFB6521144C7}"/>
+              </a:ext>
+            </a:extLst>
+          </p:cNvPr>
+          <p:cNvSpPr>
+            <a:spLocks noGrp="1"/>
+          </p:cNvSpPr>
+          <p:nvPr>
+            <p:ph type="body" sz="quarter" idx="27"/>
+          </p:nvPr>
+        </p:nvSpPr>
+        <p:spPr>
+          <a:xfrm>
+            <a:off x="3526326" y="1307335"/>
+            <a:ext cx="3084969" cy="370290"/>
+          </a:xfrm>
+          <a:ln>
+            <a:noFill/>
+          </a:ln>
+        </p:spPr>
+        <p:txBody>
+          <a:bodyPr tIns="365760" bIns="365760" anchor="ctr">
+            <a:noAutofit/>
+          </a:bodyPr>
+          <a:lstStyle>
+            <a:lvl1pPr marL="0" indent="0" algn="r">
+              <a:buNone/>
+              <a:defRPr sz="2400"/>
+            </a:lvl1pPr>
+          </a:lstStyle>
+          <a:p>
+            <a:pPr lvl="0"/>
+            <a:r>
+              <a:rPr lang="en-US"/>
+              <a:t>Click to edit Master text styles</a:t>
+            </a:r>
+          </a:p>
+        </p:txBody>
+      </p:sp>
     </p:spTree>
     <p:extLst>
       <p:ext uri="{BB962C8B-B14F-4D97-AF65-F5344CB8AC3E}">
@@ -1839,6 +1879,872 @@
 </file>
 
 <file path=ppt/slideLayouts/slideLayout4.xml><?xml version="1.0" encoding="utf-8"?>
+<p:sldLayout xmlns:a="http://schemas.openxmlformats.org/drawingml/2006/main" xmlns:r="http://schemas.openxmlformats.org/officeDocument/2006/relationships" xmlns:p="http://schemas.openxmlformats.org/presentationml/2006/main" preserve="1" userDrawn="1">
+  <p:cSld name="2_Title and Content">
+    <p:spTree>
+      <p:nvGrpSpPr>
+        <p:cNvPr id="1" name=""/>
+        <p:cNvGrpSpPr/>
+        <p:nvPr/>
+      </p:nvGrpSpPr>
+      <p:grpSpPr>
+        <a:xfrm>
+          <a:off x="0" y="0"/>
+          <a:ext cx="0" cy="0"/>
+          <a:chOff x="0" y="0"/>
+          <a:chExt cx="0" cy="0"/>
+        </a:xfrm>
+      </p:grpSpPr>
+      <p:sp>
+        <p:nvSpPr>
+          <p:cNvPr id="3" name="Content Placeholder 2"/>
+          <p:cNvSpPr>
+            <a:spLocks noGrp="1"/>
+          </p:cNvSpPr>
+          <p:nvPr>
+            <p:ph idx="1"/>
+          </p:nvPr>
+        </p:nvSpPr>
+        <p:spPr>
+          <a:xfrm>
+            <a:off x="228600" y="1716597"/>
+            <a:ext cx="3108960" cy="2011680"/>
+          </a:xfrm>
+          <a:ln>
+            <a:solidFill>
+              <a:schemeClr val="bg2">
+                <a:lumMod val="90000"/>
+              </a:schemeClr>
+            </a:solidFill>
+          </a:ln>
+        </p:spPr>
+        <p:txBody>
+          <a:bodyPr>
+            <a:normAutofit/>
+          </a:bodyPr>
+          <a:lstStyle>
+            <a:lvl1pPr>
+              <a:defRPr sz="1050"/>
+            </a:lvl1pPr>
+            <a:lvl2pPr>
+              <a:defRPr sz="1050"/>
+            </a:lvl2pPr>
+            <a:lvl3pPr>
+              <a:defRPr sz="1050"/>
+            </a:lvl3pPr>
+            <a:lvl4pPr>
+              <a:defRPr sz="1050"/>
+            </a:lvl4pPr>
+            <a:lvl5pPr>
+              <a:defRPr sz="1050"/>
+            </a:lvl5pPr>
+          </a:lstStyle>
+          <a:p>
+            <a:pPr lvl="0"/>
+            <a:r>
+              <a:rPr lang="en-US"/>
+              <a:t>Click to edit Master text styles</a:t>
+            </a:r>
+          </a:p>
+          <a:p>
+            <a:pPr lvl="1"/>
+            <a:r>
+              <a:rPr lang="en-US"/>
+              <a:t>Second level</a:t>
+            </a:r>
+          </a:p>
+          <a:p>
+            <a:pPr lvl="2"/>
+            <a:r>
+              <a:rPr lang="en-US"/>
+              <a:t>Third level</a:t>
+            </a:r>
+          </a:p>
+          <a:p>
+            <a:pPr lvl="3"/>
+            <a:r>
+              <a:rPr lang="en-US"/>
+              <a:t>Fourth level</a:t>
+            </a:r>
+          </a:p>
+          <a:p>
+            <a:pPr lvl="4"/>
+            <a:r>
+              <a:rPr lang="en-US"/>
+              <a:t>Fifth level</a:t>
+            </a:r>
+            <a:endParaRPr lang="en-US" dirty="0"/>
+          </a:p>
+        </p:txBody>
+      </p:sp>
+      <p:sp>
+        <p:nvSpPr>
+          <p:cNvPr id="4" name="Date Placeholder 3"/>
+          <p:cNvSpPr>
+            <a:spLocks noGrp="1"/>
+          </p:cNvSpPr>
+          <p:nvPr>
+            <p:ph type="dt" sz="half" idx="10"/>
+          </p:nvPr>
+        </p:nvSpPr>
+        <p:spPr/>
+        <p:txBody>
+          <a:bodyPr/>
+          <a:lstStyle/>
+          <a:p>
+            <a:fld id="{0DAB70E3-47D6-2842-9376-028C836601F0}" type="datetimeFigureOut">
+              <a:rPr lang="en-US" smtClean="0"/>
+              <a:t>8/26/19</a:t>
+            </a:fld>
+            <a:endParaRPr lang="en-US"/>
+          </a:p>
+        </p:txBody>
+      </p:sp>
+      <p:sp>
+        <p:nvSpPr>
+          <p:cNvPr id="5" name="Footer Placeholder 4"/>
+          <p:cNvSpPr>
+            <a:spLocks noGrp="1"/>
+          </p:cNvSpPr>
+          <p:nvPr>
+            <p:ph type="ftr" sz="quarter" idx="11"/>
+          </p:nvPr>
+        </p:nvSpPr>
+        <p:spPr/>
+        <p:txBody>
+          <a:bodyPr/>
+          <a:lstStyle/>
+          <a:p>
+            <a:endParaRPr lang="en-US"/>
+          </a:p>
+        </p:txBody>
+      </p:sp>
+      <p:sp>
+        <p:nvSpPr>
+          <p:cNvPr id="6" name="Slide Number Placeholder 5"/>
+          <p:cNvSpPr>
+            <a:spLocks noGrp="1"/>
+          </p:cNvSpPr>
+          <p:nvPr>
+            <p:ph type="sldNum" sz="quarter" idx="12"/>
+          </p:nvPr>
+        </p:nvSpPr>
+        <p:spPr/>
+        <p:txBody>
+          <a:bodyPr/>
+          <a:lstStyle/>
+          <a:p>
+            <a:fld id="{EBDA84D8-2017-D642-A480-A65A29EB22F2}" type="slidenum">
+              <a:rPr lang="en-US" smtClean="0"/>
+              <a:t>‹#›</a:t>
+            </a:fld>
+            <a:endParaRPr lang="en-US"/>
+          </a:p>
+        </p:txBody>
+      </p:sp>
+      <p:sp>
+        <p:nvSpPr>
+          <p:cNvPr id="33" name="TextBox 32">
+            <a:extLst>
+              <a:ext uri="{FF2B5EF4-FFF2-40B4-BE49-F238E27FC236}">
+                <a16:creationId xmlns:a16="http://schemas.microsoft.com/office/drawing/2014/main" id="{54515B47-A7C3-BB49-B87C-B01BB10685A5}"/>
+              </a:ext>
+            </a:extLst>
+          </p:cNvPr>
+          <p:cNvSpPr txBox="1"/>
+          <p:nvPr userDrawn="1"/>
+        </p:nvSpPr>
+        <p:spPr>
+          <a:xfrm>
+            <a:off x="228600" y="1439597"/>
+            <a:ext cx="1761829" cy="276999"/>
+          </a:xfrm>
+          <a:prstGeom prst="rect">
+            <a:avLst/>
+          </a:prstGeom>
+          <a:noFill/>
+        </p:spPr>
+        <p:txBody>
+          <a:bodyPr wrap="none" lIns="0" tIns="0" rIns="0" bIns="0" rtlCol="0">
+            <a:spAutoFit/>
+          </a:bodyPr>
+          <a:lstStyle/>
+          <a:p>
+            <a:r>
+              <a:rPr lang="en-US" sz="1800" dirty="0"/>
+              <a:t>Return Description</a:t>
+            </a:r>
+            <a:endParaRPr lang="en-US" sz="1200" dirty="0"/>
+          </a:p>
+        </p:txBody>
+      </p:sp>
+      <p:sp>
+        <p:nvSpPr>
+          <p:cNvPr id="59" name="Title 58">
+            <a:extLst>
+              <a:ext uri="{FF2B5EF4-FFF2-40B4-BE49-F238E27FC236}">
+                <a16:creationId xmlns:a16="http://schemas.microsoft.com/office/drawing/2014/main" id="{C2DFE595-E7EE-2246-BF46-4D09947A0699}"/>
+              </a:ext>
+            </a:extLst>
+          </p:cNvPr>
+          <p:cNvSpPr>
+            <a:spLocks noGrp="1"/>
+          </p:cNvSpPr>
+          <p:nvPr>
+            <p:ph type="title"/>
+          </p:nvPr>
+        </p:nvSpPr>
+        <p:spPr>
+          <a:xfrm>
+            <a:off x="882177" y="244538"/>
+            <a:ext cx="5715000" cy="457200"/>
+          </a:xfrm>
+        </p:spPr>
+        <p:txBody>
+          <a:bodyPr/>
+          <a:lstStyle/>
+          <a:p>
+            <a:r>
+              <a:rPr lang="en-US"/>
+              <a:t>Click to edit Master title style</a:t>
+            </a:r>
+          </a:p>
+        </p:txBody>
+      </p:sp>
+      <p:sp>
+        <p:nvSpPr>
+          <p:cNvPr id="41" name="Content Placeholder 2">
+            <a:extLst>
+              <a:ext uri="{FF2B5EF4-FFF2-40B4-BE49-F238E27FC236}">
+                <a16:creationId xmlns:a16="http://schemas.microsoft.com/office/drawing/2014/main" id="{FB189CA7-9290-5F44-AB07-DAFF5477F988}"/>
+              </a:ext>
+            </a:extLst>
+          </p:cNvPr>
+          <p:cNvSpPr>
+            <a:spLocks noGrp="1"/>
+          </p:cNvSpPr>
+          <p:nvPr>
+            <p:ph idx="13"/>
+          </p:nvPr>
+        </p:nvSpPr>
+        <p:spPr>
+          <a:xfrm>
+            <a:off x="3566160" y="1716597"/>
+            <a:ext cx="3108960" cy="2011680"/>
+          </a:xfrm>
+          <a:ln>
+            <a:solidFill>
+              <a:schemeClr val="bg2">
+                <a:lumMod val="90000"/>
+              </a:schemeClr>
+            </a:solidFill>
+          </a:ln>
+        </p:spPr>
+        <p:txBody>
+          <a:bodyPr>
+            <a:normAutofit/>
+          </a:bodyPr>
+          <a:lstStyle>
+            <a:lvl1pPr>
+              <a:defRPr sz="1050"/>
+            </a:lvl1pPr>
+            <a:lvl2pPr>
+              <a:defRPr sz="1050"/>
+            </a:lvl2pPr>
+            <a:lvl3pPr>
+              <a:defRPr sz="1050"/>
+            </a:lvl3pPr>
+            <a:lvl4pPr>
+              <a:defRPr sz="1050"/>
+            </a:lvl4pPr>
+            <a:lvl5pPr>
+              <a:defRPr sz="1050"/>
+            </a:lvl5pPr>
+          </a:lstStyle>
+          <a:p>
+            <a:pPr lvl="0"/>
+            <a:r>
+              <a:rPr lang="en-US"/>
+              <a:t>Click to edit Master text styles</a:t>
+            </a:r>
+          </a:p>
+          <a:p>
+            <a:pPr lvl="1"/>
+            <a:r>
+              <a:rPr lang="en-US"/>
+              <a:t>Second level</a:t>
+            </a:r>
+          </a:p>
+          <a:p>
+            <a:pPr lvl="2"/>
+            <a:r>
+              <a:rPr lang="en-US"/>
+              <a:t>Third level</a:t>
+            </a:r>
+          </a:p>
+          <a:p>
+            <a:pPr lvl="3"/>
+            <a:r>
+              <a:rPr lang="en-US"/>
+              <a:t>Fourth level</a:t>
+            </a:r>
+          </a:p>
+          <a:p>
+            <a:pPr lvl="4"/>
+            <a:r>
+              <a:rPr lang="en-US"/>
+              <a:t>Fifth level</a:t>
+            </a:r>
+            <a:endParaRPr lang="en-US" dirty="0"/>
+          </a:p>
+        </p:txBody>
+      </p:sp>
+      <p:sp>
+        <p:nvSpPr>
+          <p:cNvPr id="42" name="TextBox 41">
+            <a:extLst>
+              <a:ext uri="{FF2B5EF4-FFF2-40B4-BE49-F238E27FC236}">
+                <a16:creationId xmlns:a16="http://schemas.microsoft.com/office/drawing/2014/main" id="{003EDC32-DFCE-434F-834F-87AD9D4931AD}"/>
+              </a:ext>
+            </a:extLst>
+          </p:cNvPr>
+          <p:cNvSpPr txBox="1"/>
+          <p:nvPr userDrawn="1"/>
+        </p:nvSpPr>
+        <p:spPr>
+          <a:xfrm>
+            <a:off x="3566159" y="1439597"/>
+            <a:ext cx="3108960" cy="276999"/>
+          </a:xfrm>
+          <a:prstGeom prst="rect">
+            <a:avLst/>
+          </a:prstGeom>
+          <a:noFill/>
+        </p:spPr>
+        <p:txBody>
+          <a:bodyPr wrap="none" lIns="0" tIns="0" rIns="0" bIns="0" rtlCol="0">
+            <a:noAutofit/>
+          </a:bodyPr>
+          <a:lstStyle/>
+          <a:p>
+            <a:r>
+              <a:rPr lang="en-US" sz="1800" dirty="0"/>
+              <a:t>Investment Description</a:t>
+            </a:r>
+            <a:endParaRPr lang="en-US" sz="1200" dirty="0"/>
+          </a:p>
+        </p:txBody>
+      </p:sp>
+      <p:sp>
+        <p:nvSpPr>
+          <p:cNvPr id="43" name="Content Placeholder 2">
+            <a:extLst>
+              <a:ext uri="{FF2B5EF4-FFF2-40B4-BE49-F238E27FC236}">
+                <a16:creationId xmlns:a16="http://schemas.microsoft.com/office/drawing/2014/main" id="{287D95BD-5A4D-8748-87D0-27B9C457688A}"/>
+              </a:ext>
+            </a:extLst>
+          </p:cNvPr>
+          <p:cNvSpPr>
+            <a:spLocks noGrp="1"/>
+          </p:cNvSpPr>
+          <p:nvPr>
+            <p:ph idx="14"/>
+          </p:nvPr>
+        </p:nvSpPr>
+        <p:spPr>
+          <a:xfrm>
+            <a:off x="228600" y="4210997"/>
+            <a:ext cx="3108960" cy="2011680"/>
+          </a:xfrm>
+          <a:ln>
+            <a:solidFill>
+              <a:schemeClr val="bg2">
+                <a:lumMod val="90000"/>
+              </a:schemeClr>
+            </a:solidFill>
+          </a:ln>
+        </p:spPr>
+        <p:txBody>
+          <a:bodyPr>
+            <a:normAutofit/>
+          </a:bodyPr>
+          <a:lstStyle>
+            <a:lvl1pPr>
+              <a:defRPr sz="1050"/>
+            </a:lvl1pPr>
+            <a:lvl2pPr>
+              <a:defRPr sz="1050"/>
+            </a:lvl2pPr>
+            <a:lvl3pPr>
+              <a:defRPr sz="1050"/>
+            </a:lvl3pPr>
+            <a:lvl4pPr>
+              <a:defRPr sz="1050"/>
+            </a:lvl4pPr>
+            <a:lvl5pPr>
+              <a:defRPr sz="1050"/>
+            </a:lvl5pPr>
+          </a:lstStyle>
+          <a:p>
+            <a:pPr lvl="0"/>
+            <a:r>
+              <a:rPr lang="en-US"/>
+              <a:t>Click to edit Master text styles</a:t>
+            </a:r>
+          </a:p>
+          <a:p>
+            <a:pPr lvl="1"/>
+            <a:r>
+              <a:rPr lang="en-US"/>
+              <a:t>Second level</a:t>
+            </a:r>
+          </a:p>
+          <a:p>
+            <a:pPr lvl="2"/>
+            <a:r>
+              <a:rPr lang="en-US"/>
+              <a:t>Third level</a:t>
+            </a:r>
+          </a:p>
+          <a:p>
+            <a:pPr lvl="3"/>
+            <a:r>
+              <a:rPr lang="en-US"/>
+              <a:t>Fourth level</a:t>
+            </a:r>
+          </a:p>
+          <a:p>
+            <a:pPr lvl="4"/>
+            <a:r>
+              <a:rPr lang="en-US"/>
+              <a:t>Fifth level</a:t>
+            </a:r>
+            <a:endParaRPr lang="en-US" dirty="0"/>
+          </a:p>
+        </p:txBody>
+      </p:sp>
+      <p:sp>
+        <p:nvSpPr>
+          <p:cNvPr id="44" name="TextBox 43">
+            <a:extLst>
+              <a:ext uri="{FF2B5EF4-FFF2-40B4-BE49-F238E27FC236}">
+                <a16:creationId xmlns:a16="http://schemas.microsoft.com/office/drawing/2014/main" id="{A57695C7-7CFA-E643-A905-337EE18E7603}"/>
+              </a:ext>
+            </a:extLst>
+          </p:cNvPr>
+          <p:cNvSpPr txBox="1"/>
+          <p:nvPr userDrawn="1"/>
+        </p:nvSpPr>
+        <p:spPr>
+          <a:xfrm>
+            <a:off x="228600" y="3930692"/>
+            <a:ext cx="3108960" cy="276998"/>
+          </a:xfrm>
+          <a:prstGeom prst="rect">
+            <a:avLst/>
+          </a:prstGeom>
+          <a:noFill/>
+        </p:spPr>
+        <p:txBody>
+          <a:bodyPr wrap="square" lIns="0" tIns="0" rIns="0" bIns="0" rtlCol="0">
+            <a:noAutofit/>
+          </a:bodyPr>
+          <a:lstStyle/>
+          <a:p>
+            <a:r>
+              <a:rPr lang="en-US" sz="1800" dirty="0"/>
+              <a:t>Scope</a:t>
+            </a:r>
+            <a:endParaRPr lang="en-US" sz="1200" dirty="0"/>
+          </a:p>
+        </p:txBody>
+      </p:sp>
+      <p:sp>
+        <p:nvSpPr>
+          <p:cNvPr id="45" name="Content Placeholder 2">
+            <a:extLst>
+              <a:ext uri="{FF2B5EF4-FFF2-40B4-BE49-F238E27FC236}">
+                <a16:creationId xmlns:a16="http://schemas.microsoft.com/office/drawing/2014/main" id="{B0E7EE50-B7AC-AE40-9219-7CD17F23E99C}"/>
+              </a:ext>
+            </a:extLst>
+          </p:cNvPr>
+          <p:cNvSpPr>
+            <a:spLocks noGrp="1"/>
+          </p:cNvSpPr>
+          <p:nvPr>
+            <p:ph idx="15"/>
+          </p:nvPr>
+        </p:nvSpPr>
+        <p:spPr>
+          <a:xfrm>
+            <a:off x="3566160" y="4201204"/>
+            <a:ext cx="3108960" cy="2011680"/>
+          </a:xfrm>
+          <a:ln>
+            <a:solidFill>
+              <a:schemeClr val="bg2">
+                <a:lumMod val="90000"/>
+              </a:schemeClr>
+            </a:solidFill>
+          </a:ln>
+        </p:spPr>
+        <p:txBody>
+          <a:bodyPr>
+            <a:normAutofit/>
+          </a:bodyPr>
+          <a:lstStyle>
+            <a:lvl1pPr>
+              <a:defRPr sz="1050"/>
+            </a:lvl1pPr>
+            <a:lvl2pPr>
+              <a:defRPr sz="1050"/>
+            </a:lvl2pPr>
+            <a:lvl3pPr>
+              <a:defRPr sz="1050"/>
+            </a:lvl3pPr>
+            <a:lvl4pPr>
+              <a:defRPr sz="1050"/>
+            </a:lvl4pPr>
+            <a:lvl5pPr>
+              <a:defRPr sz="1050"/>
+            </a:lvl5pPr>
+          </a:lstStyle>
+          <a:p>
+            <a:pPr lvl="0"/>
+            <a:r>
+              <a:rPr lang="en-US"/>
+              <a:t>Click to edit Master text styles</a:t>
+            </a:r>
+          </a:p>
+          <a:p>
+            <a:pPr lvl="1"/>
+            <a:r>
+              <a:rPr lang="en-US"/>
+              <a:t>Second level</a:t>
+            </a:r>
+          </a:p>
+          <a:p>
+            <a:pPr lvl="2"/>
+            <a:r>
+              <a:rPr lang="en-US"/>
+              <a:t>Third level</a:t>
+            </a:r>
+          </a:p>
+          <a:p>
+            <a:pPr lvl="3"/>
+            <a:r>
+              <a:rPr lang="en-US"/>
+              <a:t>Fourth level</a:t>
+            </a:r>
+          </a:p>
+          <a:p>
+            <a:pPr lvl="4"/>
+            <a:r>
+              <a:rPr lang="en-US"/>
+              <a:t>Fifth level</a:t>
+            </a:r>
+            <a:endParaRPr lang="en-US" dirty="0"/>
+          </a:p>
+        </p:txBody>
+      </p:sp>
+      <p:sp>
+        <p:nvSpPr>
+          <p:cNvPr id="46" name="TextBox 45">
+            <a:extLst>
+              <a:ext uri="{FF2B5EF4-FFF2-40B4-BE49-F238E27FC236}">
+                <a16:creationId xmlns:a16="http://schemas.microsoft.com/office/drawing/2014/main" id="{A11BF54F-E143-EC40-AF66-62E1FDCDBF64}"/>
+              </a:ext>
+            </a:extLst>
+          </p:cNvPr>
+          <p:cNvSpPr txBox="1"/>
+          <p:nvPr userDrawn="1"/>
+        </p:nvSpPr>
+        <p:spPr>
+          <a:xfrm>
+            <a:off x="3566160" y="3924204"/>
+            <a:ext cx="3108960" cy="276999"/>
+          </a:xfrm>
+          <a:prstGeom prst="rect">
+            <a:avLst/>
+          </a:prstGeom>
+          <a:noFill/>
+        </p:spPr>
+        <p:txBody>
+          <a:bodyPr wrap="none" lIns="0" tIns="0" rIns="0" bIns="0" rtlCol="0">
+            <a:noAutofit/>
+          </a:bodyPr>
+          <a:lstStyle/>
+          <a:p>
+            <a:r>
+              <a:rPr lang="en-US" sz="1800" dirty="0"/>
+              <a:t>Scope Exclusions</a:t>
+            </a:r>
+            <a:endParaRPr lang="en-US" sz="1200" dirty="0"/>
+          </a:p>
+        </p:txBody>
+      </p:sp>
+      <p:sp>
+        <p:nvSpPr>
+          <p:cNvPr id="48" name="Content Placeholder 2">
+            <a:extLst>
+              <a:ext uri="{FF2B5EF4-FFF2-40B4-BE49-F238E27FC236}">
+                <a16:creationId xmlns:a16="http://schemas.microsoft.com/office/drawing/2014/main" id="{57F84A55-2A07-8C47-B9F4-661E70B565F7}"/>
+              </a:ext>
+            </a:extLst>
+          </p:cNvPr>
+          <p:cNvSpPr>
+            <a:spLocks noGrp="1"/>
+          </p:cNvSpPr>
+          <p:nvPr>
+            <p:ph idx="16"/>
+          </p:nvPr>
+        </p:nvSpPr>
+        <p:spPr>
+          <a:xfrm>
+            <a:off x="228600" y="6645636"/>
+            <a:ext cx="3108960" cy="2011680"/>
+          </a:xfrm>
+          <a:ln>
+            <a:solidFill>
+              <a:schemeClr val="bg2">
+                <a:lumMod val="90000"/>
+              </a:schemeClr>
+            </a:solidFill>
+          </a:ln>
+        </p:spPr>
+        <p:txBody>
+          <a:bodyPr>
+            <a:normAutofit/>
+          </a:bodyPr>
+          <a:lstStyle>
+            <a:lvl1pPr>
+              <a:defRPr sz="1050"/>
+            </a:lvl1pPr>
+            <a:lvl2pPr>
+              <a:defRPr sz="1050"/>
+            </a:lvl2pPr>
+            <a:lvl3pPr>
+              <a:defRPr sz="1050"/>
+            </a:lvl3pPr>
+            <a:lvl4pPr>
+              <a:defRPr sz="1050"/>
+            </a:lvl4pPr>
+            <a:lvl5pPr>
+              <a:defRPr sz="1050"/>
+            </a:lvl5pPr>
+          </a:lstStyle>
+          <a:p>
+            <a:pPr lvl="0"/>
+            <a:r>
+              <a:rPr lang="en-US"/>
+              <a:t>Click to edit Master text styles</a:t>
+            </a:r>
+          </a:p>
+          <a:p>
+            <a:pPr lvl="1"/>
+            <a:r>
+              <a:rPr lang="en-US"/>
+              <a:t>Second level</a:t>
+            </a:r>
+          </a:p>
+          <a:p>
+            <a:pPr lvl="2"/>
+            <a:r>
+              <a:rPr lang="en-US"/>
+              <a:t>Third level</a:t>
+            </a:r>
+          </a:p>
+          <a:p>
+            <a:pPr lvl="3"/>
+            <a:r>
+              <a:rPr lang="en-US"/>
+              <a:t>Fourth level</a:t>
+            </a:r>
+          </a:p>
+          <a:p>
+            <a:pPr lvl="4"/>
+            <a:r>
+              <a:rPr lang="en-US"/>
+              <a:t>Fifth level</a:t>
+            </a:r>
+            <a:endParaRPr lang="en-US" dirty="0"/>
+          </a:p>
+        </p:txBody>
+      </p:sp>
+      <p:sp>
+        <p:nvSpPr>
+          <p:cNvPr id="49" name="TextBox 48">
+            <a:extLst>
+              <a:ext uri="{FF2B5EF4-FFF2-40B4-BE49-F238E27FC236}">
+                <a16:creationId xmlns:a16="http://schemas.microsoft.com/office/drawing/2014/main" id="{85C8698D-AD6C-B145-88B0-98CA98861CF7}"/>
+              </a:ext>
+            </a:extLst>
+          </p:cNvPr>
+          <p:cNvSpPr txBox="1"/>
+          <p:nvPr userDrawn="1"/>
+        </p:nvSpPr>
+        <p:spPr>
+          <a:xfrm>
+            <a:off x="228600" y="6365331"/>
+            <a:ext cx="3108960" cy="276998"/>
+          </a:xfrm>
+          <a:prstGeom prst="rect">
+            <a:avLst/>
+          </a:prstGeom>
+          <a:noFill/>
+        </p:spPr>
+        <p:txBody>
+          <a:bodyPr wrap="square" lIns="0" tIns="0" rIns="0" bIns="0" rtlCol="0">
+            <a:noAutofit/>
+          </a:bodyPr>
+          <a:lstStyle/>
+          <a:p>
+            <a:r>
+              <a:rPr lang="en-US" sz="1800" dirty="0"/>
+              <a:t>Business Area Impacts</a:t>
+            </a:r>
+            <a:endParaRPr lang="en-US" sz="1200" dirty="0"/>
+          </a:p>
+        </p:txBody>
+      </p:sp>
+      <p:sp>
+        <p:nvSpPr>
+          <p:cNvPr id="50" name="Content Placeholder 2">
+            <a:extLst>
+              <a:ext uri="{FF2B5EF4-FFF2-40B4-BE49-F238E27FC236}">
+                <a16:creationId xmlns:a16="http://schemas.microsoft.com/office/drawing/2014/main" id="{699D0DDC-AFCE-0748-8AE4-761B47D9D563}"/>
+              </a:ext>
+            </a:extLst>
+          </p:cNvPr>
+          <p:cNvSpPr>
+            <a:spLocks noGrp="1"/>
+          </p:cNvSpPr>
+          <p:nvPr>
+            <p:ph idx="17"/>
+          </p:nvPr>
+        </p:nvSpPr>
+        <p:spPr>
+          <a:xfrm>
+            <a:off x="3566160" y="6635843"/>
+            <a:ext cx="3108960" cy="2011680"/>
+          </a:xfrm>
+          <a:ln>
+            <a:solidFill>
+              <a:schemeClr val="bg2">
+                <a:lumMod val="90000"/>
+              </a:schemeClr>
+            </a:solidFill>
+          </a:ln>
+        </p:spPr>
+        <p:txBody>
+          <a:bodyPr>
+            <a:normAutofit/>
+          </a:bodyPr>
+          <a:lstStyle>
+            <a:lvl1pPr>
+              <a:defRPr sz="1050"/>
+            </a:lvl1pPr>
+            <a:lvl2pPr>
+              <a:defRPr sz="1050"/>
+            </a:lvl2pPr>
+            <a:lvl3pPr>
+              <a:defRPr sz="1050"/>
+            </a:lvl3pPr>
+            <a:lvl4pPr>
+              <a:defRPr sz="1050"/>
+            </a:lvl4pPr>
+            <a:lvl5pPr>
+              <a:defRPr sz="1050"/>
+            </a:lvl5pPr>
+          </a:lstStyle>
+          <a:p>
+            <a:pPr lvl="0"/>
+            <a:r>
+              <a:rPr lang="en-US"/>
+              <a:t>Click to edit Master text styles</a:t>
+            </a:r>
+          </a:p>
+          <a:p>
+            <a:pPr lvl="1"/>
+            <a:r>
+              <a:rPr lang="en-US"/>
+              <a:t>Second level</a:t>
+            </a:r>
+          </a:p>
+          <a:p>
+            <a:pPr lvl="2"/>
+            <a:r>
+              <a:rPr lang="en-US"/>
+              <a:t>Third level</a:t>
+            </a:r>
+          </a:p>
+          <a:p>
+            <a:pPr lvl="3"/>
+            <a:r>
+              <a:rPr lang="en-US"/>
+              <a:t>Fourth level</a:t>
+            </a:r>
+          </a:p>
+          <a:p>
+            <a:pPr lvl="4"/>
+            <a:r>
+              <a:rPr lang="en-US"/>
+              <a:t>Fifth level</a:t>
+            </a:r>
+            <a:endParaRPr lang="en-US" dirty="0"/>
+          </a:p>
+        </p:txBody>
+      </p:sp>
+      <p:sp>
+        <p:nvSpPr>
+          <p:cNvPr id="51" name="TextBox 50">
+            <a:extLst>
+              <a:ext uri="{FF2B5EF4-FFF2-40B4-BE49-F238E27FC236}">
+                <a16:creationId xmlns:a16="http://schemas.microsoft.com/office/drawing/2014/main" id="{38A317C3-F06F-8A4A-B5A3-597AEA54B8CC}"/>
+              </a:ext>
+            </a:extLst>
+          </p:cNvPr>
+          <p:cNvSpPr txBox="1"/>
+          <p:nvPr userDrawn="1"/>
+        </p:nvSpPr>
+        <p:spPr>
+          <a:xfrm>
+            <a:off x="3566160" y="6358843"/>
+            <a:ext cx="3108960" cy="276999"/>
+          </a:xfrm>
+          <a:prstGeom prst="rect">
+            <a:avLst/>
+          </a:prstGeom>
+          <a:noFill/>
+        </p:spPr>
+        <p:txBody>
+          <a:bodyPr wrap="none" lIns="0" tIns="0" rIns="0" bIns="0" rtlCol="0">
+            <a:noAutofit/>
+          </a:bodyPr>
+          <a:lstStyle/>
+          <a:p>
+            <a:r>
+              <a:rPr lang="en-US" sz="1800" dirty="0"/>
+              <a:t>Systems</a:t>
+            </a:r>
+            <a:endParaRPr lang="en-US" sz="1200" dirty="0"/>
+          </a:p>
+        </p:txBody>
+      </p:sp>
+    </p:spTree>
+    <p:extLst>
+      <p:ext uri="{BB962C8B-B14F-4D97-AF65-F5344CB8AC3E}">
+        <p14:creationId xmlns:p14="http://schemas.microsoft.com/office/powerpoint/2010/main" val="2082138833"/>
+      </p:ext>
+    </p:extLst>
+  </p:cSld>
+  <p:clrMapOvr>
+    <a:masterClrMapping/>
+  </p:clrMapOvr>
+</p:sldLayout>
+</file>
+
+<file path=ppt/slideLayouts/slideLayout5.xml><?xml version="1.0" encoding="utf-8"?>
 <p:sldLayout xmlns:a="http://schemas.openxmlformats.org/drawingml/2006/main" xmlns:r="http://schemas.openxmlformats.org/officeDocument/2006/relationships" xmlns:p="http://schemas.openxmlformats.org/presentationml/2006/main" type="twoObj" preserve="1">
   <p:cSld name="Two Content">
     <p:spTree>
@@ -2009,7 +2915,7 @@
           <a:p>
             <a:fld id="{0DAB70E3-47D6-2842-9376-028C836601F0}" type="datetimeFigureOut">
               <a:rPr lang="en-US" smtClean="0"/>
-              <a:t>8/25/19</a:t>
+              <a:t>8/26/19</a:t>
             </a:fld>
             <a:endParaRPr lang="en-US"/>
           </a:p>
@@ -2075,7 +2981,7 @@
 </p:sldLayout>
 </file>
 
-<file path=ppt/slideLayouts/slideLayout5.xml><?xml version="1.0" encoding="utf-8"?>
+<file path=ppt/slideLayouts/slideLayout6.xml><?xml version="1.0" encoding="utf-8"?>
 <p:sldLayout xmlns:a="http://schemas.openxmlformats.org/drawingml/2006/main" xmlns:r="http://schemas.openxmlformats.org/officeDocument/2006/relationships" xmlns:p="http://schemas.openxmlformats.org/presentationml/2006/main" type="twoTxTwoObj" preserve="1">
   <p:cSld name="Comparison">
     <p:spTree>
@@ -2381,7 +3287,7 @@
           <a:p>
             <a:fld id="{0DAB70E3-47D6-2842-9376-028C836601F0}" type="datetimeFigureOut">
               <a:rPr lang="en-US" smtClean="0"/>
-              <a:t>8/25/19</a:t>
+              <a:t>8/26/19</a:t>
             </a:fld>
             <a:endParaRPr lang="en-US"/>
           </a:p>
@@ -2442,7 +3348,7 @@
 </p:sldLayout>
 </file>
 
-<file path=ppt/slideLayouts/slideLayout6.xml><?xml version="1.0" encoding="utf-8"?>
+<file path=ppt/slideLayouts/slideLayout7.xml><?xml version="1.0" encoding="utf-8"?>
 <p:sldLayout xmlns:a="http://schemas.openxmlformats.org/drawingml/2006/main" xmlns:r="http://schemas.openxmlformats.org/officeDocument/2006/relationships" xmlns:p="http://schemas.openxmlformats.org/presentationml/2006/main" type="titleOnly" preserve="1">
   <p:cSld name="Title Only">
     <p:spTree>
@@ -2499,7 +3405,7 @@
           <a:p>
             <a:fld id="{0DAB70E3-47D6-2842-9376-028C836601F0}" type="datetimeFigureOut">
               <a:rPr lang="en-US" smtClean="0"/>
-              <a:t>8/25/19</a:t>
+              <a:t>8/26/19</a:t>
             </a:fld>
             <a:endParaRPr lang="en-US"/>
           </a:p>
@@ -2560,8 +3466,8 @@
 </p:sldLayout>
 </file>
 
-<file path=ppt/slideLayouts/slideLayout7.xml><?xml version="1.0" encoding="utf-8"?>
-<p:sldLayout xmlns:a="http://schemas.openxmlformats.org/drawingml/2006/main" xmlns:r="http://schemas.openxmlformats.org/officeDocument/2006/relationships" xmlns:p="http://schemas.openxmlformats.org/presentationml/2006/main" type="blank" preserve="1">
+<file path=ppt/slideLayouts/slideLayout8.xml><?xml version="1.0" encoding="utf-8"?>
+<p:sldLayout xmlns:a="http://schemas.openxmlformats.org/drawingml/2006/main" xmlns:r="http://schemas.openxmlformats.org/officeDocument/2006/relationships" xmlns:p="http://schemas.openxmlformats.org/presentationml/2006/main" showMasterSp="0" type="blank" preserve="1">
   <p:cSld name="Blank">
     <p:spTree>
       <p:nvGrpSpPr>
@@ -2577,71 +3483,6 @@
           <a:chExt cx="0" cy="0"/>
         </a:xfrm>
       </p:grpSpPr>
-      <p:sp>
-        <p:nvSpPr>
-          <p:cNvPr id="2" name="Date Placeholder 1"/>
-          <p:cNvSpPr>
-            <a:spLocks noGrp="1"/>
-          </p:cNvSpPr>
-          <p:nvPr>
-            <p:ph type="dt" sz="half" idx="10"/>
-          </p:nvPr>
-        </p:nvSpPr>
-        <p:spPr/>
-        <p:txBody>
-          <a:bodyPr/>
-          <a:lstStyle/>
-          <a:p>
-            <a:fld id="{0DAB70E3-47D6-2842-9376-028C836601F0}" type="datetimeFigureOut">
-              <a:rPr lang="en-US" smtClean="0"/>
-              <a:t>8/25/19</a:t>
-            </a:fld>
-            <a:endParaRPr lang="en-US"/>
-          </a:p>
-        </p:txBody>
-      </p:sp>
-      <p:sp>
-        <p:nvSpPr>
-          <p:cNvPr id="3" name="Footer Placeholder 2"/>
-          <p:cNvSpPr>
-            <a:spLocks noGrp="1"/>
-          </p:cNvSpPr>
-          <p:nvPr>
-            <p:ph type="ftr" sz="quarter" idx="11"/>
-          </p:nvPr>
-        </p:nvSpPr>
-        <p:spPr/>
-        <p:txBody>
-          <a:bodyPr/>
-          <a:lstStyle/>
-          <a:p>
-            <a:endParaRPr lang="en-US"/>
-          </a:p>
-        </p:txBody>
-      </p:sp>
-      <p:sp>
-        <p:nvSpPr>
-          <p:cNvPr id="4" name="Slide Number Placeholder 3"/>
-          <p:cNvSpPr>
-            <a:spLocks noGrp="1"/>
-          </p:cNvSpPr>
-          <p:nvPr>
-            <p:ph type="sldNum" sz="quarter" idx="12"/>
-          </p:nvPr>
-        </p:nvSpPr>
-        <p:spPr/>
-        <p:txBody>
-          <a:bodyPr/>
-          <a:lstStyle/>
-          <a:p>
-            <a:fld id="{EBDA84D8-2017-D642-A480-A65A29EB22F2}" type="slidenum">
-              <a:rPr lang="en-US" smtClean="0"/>
-              <a:t>‹#›</a:t>
-            </a:fld>
-            <a:endParaRPr lang="en-US"/>
-          </a:p>
-        </p:txBody>
-      </p:sp>
     </p:spTree>
     <p:extLst>
       <p:ext uri="{BB962C8B-B14F-4D97-AF65-F5344CB8AC3E}">
@@ -2655,7 +3496,7 @@
 </p:sldLayout>
 </file>
 
-<file path=ppt/slideLayouts/slideLayout8.xml><?xml version="1.0" encoding="utf-8"?>
+<file path=ppt/slideLayouts/slideLayout9.xml><?xml version="1.0" encoding="utf-8"?>
 <p:sldLayout xmlns:a="http://schemas.openxmlformats.org/drawingml/2006/main" xmlns:r="http://schemas.openxmlformats.org/officeDocument/2006/relationships" xmlns:p="http://schemas.openxmlformats.org/presentationml/2006/main" preserve="1" userDrawn="1">
   <p:cSld name="Title and Vertical Text">
     <p:spTree>
@@ -2774,7 +3615,7 @@
           <a:p>
             <a:fld id="{0DAB70E3-47D6-2842-9376-028C836601F0}" type="datetimeFigureOut">
               <a:rPr lang="en-US" smtClean="0"/>
-              <a:t>8/25/19</a:t>
+              <a:t>8/26/19</a:t>
             </a:fld>
             <a:endParaRPr lang="en-US"/>
           </a:p>
@@ -2987,7 +3828,7 @@
           <a:p>
             <a:fld id="{0DAB70E3-47D6-2842-9376-028C836601F0}" type="datetimeFigureOut">
               <a:rPr lang="en-US" smtClean="0"/>
-              <a:t>8/25/19</a:t>
+              <a:t>8/26/19</a:t>
             </a:fld>
             <a:endParaRPr lang="en-US"/>
           </a:p>
@@ -3086,7 +3927,7 @@
           <p:nvPr userDrawn="1"/>
         </p:nvPicPr>
         <p:blipFill>
-          <a:blip r:embed="rId10"/>
+          <a:blip r:embed="rId11"/>
           <a:stretch>
             <a:fillRect/>
           </a:stretch>
@@ -3113,11 +3954,12 @@
     <p:sldLayoutId id="2147483661" r:id="rId1"/>
     <p:sldLayoutId id="2147483662" r:id="rId2"/>
     <p:sldLayoutId id="2147483671" r:id="rId3"/>
-    <p:sldLayoutId id="2147483664" r:id="rId4"/>
-    <p:sldLayoutId id="2147483665" r:id="rId5"/>
-    <p:sldLayoutId id="2147483666" r:id="rId6"/>
-    <p:sldLayoutId id="2147483667" r:id="rId7"/>
-    <p:sldLayoutId id="2147483670" r:id="rId8"/>
+    <p:sldLayoutId id="2147483672" r:id="rId4"/>
+    <p:sldLayoutId id="2147483664" r:id="rId5"/>
+    <p:sldLayoutId id="2147483665" r:id="rId6"/>
+    <p:sldLayoutId id="2147483666" r:id="rId7"/>
+    <p:sldLayoutId id="2147483667" r:id="rId8"/>
+    <p:sldLayoutId id="2147483670" r:id="rId9"/>
   </p:sldLayoutIdLst>
   <p:txStyles>
     <p:titleStyle>
@@ -3657,7 +4499,7 @@
   <a:extraClrSchemeLst/>
   <a:extLst>
     <a:ext uri="{05A4C25C-085E-4340-85A3-A5531E510DB2}">
-      <thm15:themeFamily xmlns:thm15="http://schemas.microsoft.com/office/thememl/2012/main" name="Project Approval Status Portrait Letter" id="{87225FA0-24F5-3A48-95C7-F8FB093C4267}" vid="{05D6E473-3CA2-A440-A4E7-70EB9473FFD3}"/>
+      <thm15:themeFamily xmlns:thm15="http://schemas.microsoft.com/office/thememl/2012/main" name="Project Approval Status Portrait Letter" id="{957A60BC-30D0-B441-971B-8329AFB3425B}" vid="{21C49611-0B28-764E-A3C9-660385D882FC}"/>
     </a:ext>
   </a:extLst>
 </a:theme>

</xml_diff>